<commit_message>
Se agrega el logo de la aplicación
</commit_message>
<xml_diff>
--- a/Template con trancisiones.pptx
+++ b/Template con trancisiones.pptx
@@ -254,7 +254,7 @@
           <a:p>
             <a:fld id="{3FDFAF59-80FD-42F8-B77B-6179688B7234}" type="datetimeFigureOut">
               <a:rPr lang="de-DE" smtClean="0"/>
-              <a:t>16.01.2020</a:t>
+              <a:t>17.01.2020</a:t>
             </a:fld>
             <a:endParaRPr lang="de-DE"/>
           </a:p>
@@ -422,7 +422,7 @@
           <a:p>
             <a:fld id="{3FDFAF59-80FD-42F8-B77B-6179688B7234}" type="datetimeFigureOut">
               <a:rPr lang="de-DE" smtClean="0"/>
-              <a:t>16.01.2020</a:t>
+              <a:t>17.01.2020</a:t>
             </a:fld>
             <a:endParaRPr lang="de-DE"/>
           </a:p>
@@ -600,7 +600,7 @@
           <a:p>
             <a:fld id="{3FDFAF59-80FD-42F8-B77B-6179688B7234}" type="datetimeFigureOut">
               <a:rPr lang="de-DE" smtClean="0"/>
-              <a:t>16.01.2020</a:t>
+              <a:t>17.01.2020</a:t>
             </a:fld>
             <a:endParaRPr lang="de-DE"/>
           </a:p>
@@ -768,7 +768,7 @@
           <a:p>
             <a:fld id="{3FDFAF59-80FD-42F8-B77B-6179688B7234}" type="datetimeFigureOut">
               <a:rPr lang="de-DE" smtClean="0"/>
-              <a:t>16.01.2020</a:t>
+              <a:t>17.01.2020</a:t>
             </a:fld>
             <a:endParaRPr lang="de-DE"/>
           </a:p>
@@ -1013,7 +1013,7 @@
           <a:p>
             <a:fld id="{3FDFAF59-80FD-42F8-B77B-6179688B7234}" type="datetimeFigureOut">
               <a:rPr lang="de-DE" smtClean="0"/>
-              <a:t>16.01.2020</a:t>
+              <a:t>17.01.2020</a:t>
             </a:fld>
             <a:endParaRPr lang="de-DE"/>
           </a:p>
@@ -1242,7 +1242,7 @@
           <a:p>
             <a:fld id="{3FDFAF59-80FD-42F8-B77B-6179688B7234}" type="datetimeFigureOut">
               <a:rPr lang="de-DE" smtClean="0"/>
-              <a:t>16.01.2020</a:t>
+              <a:t>17.01.2020</a:t>
             </a:fld>
             <a:endParaRPr lang="de-DE"/>
           </a:p>
@@ -1606,7 +1606,7 @@
           <a:p>
             <a:fld id="{3FDFAF59-80FD-42F8-B77B-6179688B7234}" type="datetimeFigureOut">
               <a:rPr lang="de-DE" smtClean="0"/>
-              <a:t>16.01.2020</a:t>
+              <a:t>17.01.2020</a:t>
             </a:fld>
             <a:endParaRPr lang="de-DE"/>
           </a:p>
@@ -1723,7 +1723,7 @@
           <a:p>
             <a:fld id="{3FDFAF59-80FD-42F8-B77B-6179688B7234}" type="datetimeFigureOut">
               <a:rPr lang="de-DE" smtClean="0"/>
-              <a:t>16.01.2020</a:t>
+              <a:t>17.01.2020</a:t>
             </a:fld>
             <a:endParaRPr lang="de-DE"/>
           </a:p>
@@ -1818,7 +1818,7 @@
           <a:p>
             <a:fld id="{3FDFAF59-80FD-42F8-B77B-6179688B7234}" type="datetimeFigureOut">
               <a:rPr lang="de-DE" smtClean="0"/>
-              <a:t>16.01.2020</a:t>
+              <a:t>17.01.2020</a:t>
             </a:fld>
             <a:endParaRPr lang="de-DE"/>
           </a:p>
@@ -2093,7 +2093,7 @@
           <a:p>
             <a:fld id="{3FDFAF59-80FD-42F8-B77B-6179688B7234}" type="datetimeFigureOut">
               <a:rPr lang="de-DE" smtClean="0"/>
-              <a:t>16.01.2020</a:t>
+              <a:t>17.01.2020</a:t>
             </a:fld>
             <a:endParaRPr lang="de-DE"/>
           </a:p>
@@ -2345,7 +2345,7 @@
           <a:p>
             <a:fld id="{3FDFAF59-80FD-42F8-B77B-6179688B7234}" type="datetimeFigureOut">
               <a:rPr lang="de-DE" smtClean="0"/>
-              <a:t>16.01.2020</a:t>
+              <a:t>17.01.2020</a:t>
             </a:fld>
             <a:endParaRPr lang="de-DE"/>
           </a:p>
@@ -2559,7 +2559,7 @@
           <a:p>
             <a:fld id="{3FDFAF59-80FD-42F8-B77B-6179688B7234}" type="datetimeFigureOut">
               <a:rPr lang="de-DE" smtClean="0"/>
-              <a:t>16.01.2020</a:t>
+              <a:t>17.01.2020</a:t>
             </a:fld>
             <a:endParaRPr lang="de-DE"/>
           </a:p>
@@ -4630,10 +4630,10 @@
       </p:grpSp>
       <p:sp>
         <p:nvSpPr>
-          <p:cNvPr id="60" name="TextBox 3">
+          <p:cNvPr id="61" name="TextBox 12">
             <a:extLst>
               <a:ext uri="{FF2B5EF4-FFF2-40B4-BE49-F238E27FC236}">
-                <a16:creationId xmlns:a16="http://schemas.microsoft.com/office/drawing/2014/main" id="{57064F59-C3E0-4AF3-BD1D-29F78BAC1667}"/>
+                <a16:creationId xmlns:a16="http://schemas.microsoft.com/office/drawing/2014/main" id="{E4093710-461F-4E43-BFBB-82846B3648B8}"/>
               </a:ext>
             </a:extLst>
           </p:cNvPr>
@@ -4642,8 +4642,8 @@
         </p:nvSpPr>
         <p:spPr>
           <a:xfrm>
-            <a:off x="4081622" y="1808922"/>
-            <a:ext cx="7596856" cy="1323439"/>
+            <a:off x="4540309" y="4406413"/>
+            <a:ext cx="6864029" cy="646331"/>
           </a:xfrm>
           <a:prstGeom prst="rect">
             <a:avLst/>
@@ -4658,77 +4658,44 @@
           <a:p>
             <a:pPr algn="ctr"/>
             <a:r>
-              <a:rPr lang="es-MX" sz="8000" dirty="0">
+              <a:rPr lang="es-MX" sz="3600" dirty="0">
                 <a:solidFill>
-                  <a:schemeClr val="accent5"/>
-                </a:solidFill>
-                <a:latin typeface="Tw Cen MT" panose="020B0602020104020603" pitchFamily="34" charset="0"/>
-              </a:rPr>
-              <a:t>App-Empresarial</a:t>
-            </a:r>
-          </a:p>
-        </p:txBody>
-      </p:sp>
-      <p:sp>
-        <p:nvSpPr>
-          <p:cNvPr id="61" name="TextBox 12">
-            <a:extLst>
-              <a:ext uri="{FF2B5EF4-FFF2-40B4-BE49-F238E27FC236}">
-                <a16:creationId xmlns:a16="http://schemas.microsoft.com/office/drawing/2014/main" id="{E4093710-461F-4E43-BFBB-82846B3648B8}"/>
-              </a:ext>
-            </a:extLst>
-          </p:cNvPr>
-          <p:cNvSpPr txBox="1"/>
-          <p:nvPr/>
-        </p:nvSpPr>
-        <p:spPr>
-          <a:xfrm>
-            <a:off x="4993354" y="3333067"/>
-            <a:ext cx="5773391" cy="523220"/>
-          </a:xfrm>
-          <a:prstGeom prst="rect">
-            <a:avLst/>
-          </a:prstGeom>
-          <a:noFill/>
-        </p:spPr>
-        <p:txBody>
-          <a:bodyPr wrap="square" rtlCol="0">
-            <a:spAutoFit/>
-          </a:bodyPr>
-          <a:lstStyle/>
-          <a:p>
-            <a:pPr algn="ctr"/>
-            <a:r>
-              <a:rPr lang="es-MX" sz="2800" dirty="0">
-                <a:solidFill>
-                  <a:schemeClr val="tx2"/>
+                  <a:schemeClr val="accent6">
+                    <a:lumMod val="50000"/>
+                  </a:schemeClr>
                 </a:solidFill>
                 <a:latin typeface="Tw Cen MT" panose="020B0602020104020603" pitchFamily="34" charset="0"/>
               </a:rPr>
               <a:t>Semillero</a:t>
             </a:r>
             <a:r>
-              <a:rPr lang="en-US" sz="2800" dirty="0">
+              <a:rPr lang="en-US" sz="3600" dirty="0">
                 <a:solidFill>
-                  <a:schemeClr val="tx2"/>
+                  <a:schemeClr val="accent6">
+                    <a:lumMod val="50000"/>
+                  </a:schemeClr>
                 </a:solidFill>
                 <a:latin typeface="Tw Cen MT" panose="020B0602020104020603" pitchFamily="34" charset="0"/>
               </a:rPr>
               <a:t> de </a:t>
             </a:r>
             <a:r>
-              <a:rPr lang="es-MX" sz="2800" dirty="0">
+              <a:rPr lang="es-MX" sz="3600" dirty="0">
                 <a:solidFill>
-                  <a:schemeClr val="tx2"/>
+                  <a:schemeClr val="accent6">
+                    <a:lumMod val="50000"/>
+                  </a:schemeClr>
                 </a:solidFill>
                 <a:latin typeface="Tw Cen MT" panose="020B0602020104020603" pitchFamily="34" charset="0"/>
               </a:rPr>
               <a:t>talento</a:t>
             </a:r>
             <a:r>
-              <a:rPr lang="en-US" sz="2800" dirty="0">
+              <a:rPr lang="en-US" sz="3600" dirty="0">
                 <a:solidFill>
-                  <a:schemeClr val="tx2"/>
+                  <a:schemeClr val="accent6">
+                    <a:lumMod val="50000"/>
+                  </a:schemeClr>
                 </a:solidFill>
                 <a:latin typeface="Tw Cen MT" panose="020B0602020104020603" pitchFamily="34" charset="0"/>
               </a:rPr>
@@ -4751,7 +4718,7 @@
         </p:nvGrpSpPr>
         <p:grpSpPr>
           <a:xfrm>
-            <a:off x="5457207" y="4056993"/>
+            <a:off x="5496963" y="5148969"/>
             <a:ext cx="4845684" cy="451824"/>
             <a:chOff x="4025723" y="4548276"/>
             <a:chExt cx="4845684" cy="451824"/>
@@ -4798,9 +4765,9 @@
                 <a:avLst/>
               </a:prstGeom>
               <a:solidFill>
-                <a:schemeClr val="accent1">
-                  <a:lumMod val="20000"/>
-                  <a:lumOff val="80000"/>
+                <a:schemeClr val="accent6">
+                  <a:lumMod val="40000"/>
+                  <a:lumOff val="60000"/>
                 </a:schemeClr>
               </a:solidFill>
               <a:ln>
@@ -4853,9 +4820,9 @@
                 <a:avLst/>
               </a:prstGeom>
               <a:solidFill>
-                <a:schemeClr val="accent1">
-                  <a:lumMod val="40000"/>
-                  <a:lumOff val="60000"/>
+                <a:schemeClr val="accent6">
+                  <a:lumMod val="60000"/>
+                  <a:lumOff val="40000"/>
                 </a:schemeClr>
               </a:solidFill>
               <a:ln>
@@ -4908,9 +4875,8 @@
                 <a:avLst/>
               </a:prstGeom>
               <a:solidFill>
-                <a:schemeClr val="accent1">
-                  <a:lumMod val="60000"/>
-                  <a:lumOff val="40000"/>
+                <a:schemeClr val="accent6">
+                  <a:lumMod val="75000"/>
                 </a:schemeClr>
               </a:solidFill>
               <a:ln>
@@ -4963,9 +4929,7 @@
                 <a:avLst/>
               </a:prstGeom>
               <a:solidFill>
-                <a:schemeClr val="accent1">
-                  <a:lumMod val="75000"/>
-                </a:schemeClr>
+                <a:srgbClr val="366B22"/>
               </a:solidFill>
               <a:ln>
                 <a:noFill/>
@@ -5017,9 +4981,8 @@
                 <a:avLst/>
               </a:prstGeom>
               <a:solidFill>
-                <a:schemeClr val="accent1">
-                  <a:lumMod val="60000"/>
-                  <a:lumOff val="40000"/>
+                <a:schemeClr val="accent6">
+                  <a:lumMod val="75000"/>
                 </a:schemeClr>
               </a:solidFill>
               <a:ln>
@@ -5072,9 +5035,9 @@
                 <a:avLst/>
               </a:prstGeom>
               <a:solidFill>
-                <a:schemeClr val="accent1">
-                  <a:lumMod val="40000"/>
-                  <a:lumOff val="60000"/>
+                <a:schemeClr val="accent6">
+                  <a:lumMod val="60000"/>
+                  <a:lumOff val="40000"/>
                 </a:schemeClr>
               </a:solidFill>
               <a:ln>
@@ -5128,9 +5091,9 @@
               <a:avLst/>
             </a:prstGeom>
             <a:solidFill>
-              <a:schemeClr val="accent1">
-                <a:lumMod val="20000"/>
-                <a:lumOff val="80000"/>
+              <a:schemeClr val="accent6">
+                <a:lumMod val="40000"/>
+                <a:lumOff val="60000"/>
               </a:schemeClr>
             </a:solidFill>
             <a:ln>
@@ -5163,6 +5126,45 @@
           </p:txBody>
         </p:sp>
       </p:grpSp>
+      <p:pic>
+        <p:nvPicPr>
+          <p:cNvPr id="3" name="Gráfico 2">
+            <a:extLst>
+              <a:ext uri="{FF2B5EF4-FFF2-40B4-BE49-F238E27FC236}">
+                <a16:creationId xmlns:a16="http://schemas.microsoft.com/office/drawing/2014/main" id="{A6D1D0E0-34F7-4BFD-8957-1CD8E7B05CD6}"/>
+              </a:ext>
+            </a:extLst>
+          </p:cNvPr>
+          <p:cNvPicPr>
+            <a:picLocks noChangeAspect="1"/>
+          </p:cNvPicPr>
+          <p:nvPr/>
+        </p:nvPicPr>
+        <p:blipFill>
+          <a:blip r:embed="rId8">
+            <a:extLst>
+              <a:ext uri="{28A0092B-C50C-407E-A947-70E740481C1C}">
+                <a14:useLocalDpi xmlns:a14="http://schemas.microsoft.com/office/drawing/2010/main" val="0"/>
+              </a:ext>
+              <a:ext uri="{96DAC541-7B7A-43D3-8B79-37D633B846F1}">
+                <asvg:svgBlip xmlns:asvg="http://schemas.microsoft.com/office/drawing/2016/SVG/main" r:embed="rId9"/>
+              </a:ext>
+            </a:extLst>
+          </a:blip>
+          <a:stretch>
+            <a:fillRect/>
+          </a:stretch>
+        </p:blipFill>
+        <p:spPr>
+          <a:xfrm>
+            <a:off x="6731548" y="659375"/>
+            <a:ext cx="2481553" cy="3547161"/>
+          </a:xfrm>
+          <a:prstGeom prst="rect">
+            <a:avLst/>
+          </a:prstGeom>
+        </p:spPr>
+      </p:pic>
     </p:spTree>
     <p:extLst>
       <p:ext uri="{BB962C8B-B14F-4D97-AF65-F5344CB8AC3E}">
@@ -16509,7 +16511,7 @@
         </p:nvSpPr>
         <p:spPr>
           <a:xfrm>
-            <a:off x="3324525" y="310193"/>
+            <a:off x="4499269" y="239897"/>
             <a:ext cx="1858114" cy="584775"/>
           </a:xfrm>
           <a:prstGeom prst="rect">
@@ -16584,7 +16586,7 @@
           <p:spPr>
             <a:xfrm>
               <a:off x="7227372" y="2269164"/>
-              <a:ext cx="1822013" cy="1822011"/>
+              <a:ext cx="1933923" cy="1933921"/>
             </a:xfrm>
             <a:prstGeom prst="ellipse">
               <a:avLst/>
@@ -16865,7 +16867,7 @@
         </p:nvSpPr>
         <p:spPr>
           <a:xfrm>
-            <a:off x="3425113" y="3007145"/>
+            <a:off x="4543829" y="3099345"/>
             <a:ext cx="1774814" cy="584775"/>
           </a:xfrm>
           <a:prstGeom prst="rect">
@@ -16906,8 +16908,8 @@
         </p:nvGrpSpPr>
         <p:grpSpPr>
           <a:xfrm>
-            <a:off x="8324934" y="2638310"/>
-            <a:ext cx="2120147" cy="2587763"/>
+            <a:off x="8039357" y="877994"/>
+            <a:ext cx="2681251" cy="2587763"/>
             <a:chOff x="3888254" y="1875838"/>
             <a:chExt cx="4045435" cy="4715135"/>
           </a:xfrm>
@@ -16939,8 +16941,8 @@
           </p:blipFill>
           <p:spPr>
             <a:xfrm>
-              <a:off x="4786965" y="1875838"/>
-              <a:ext cx="2334003" cy="2334000"/>
+              <a:off x="4786966" y="1875838"/>
+              <a:ext cx="2029971" cy="2334000"/>
             </a:xfrm>
             <a:prstGeom prst="ellipse">
               <a:avLst/>
@@ -17012,7 +17014,7 @@
         </p:nvSpPr>
         <p:spPr>
           <a:xfrm>
-            <a:off x="8658291" y="1921371"/>
+            <a:off x="8654585" y="293217"/>
             <a:ext cx="1491566" cy="584775"/>
           </a:xfrm>
           <a:prstGeom prst="rect">
@@ -17035,6 +17037,144 @@
                 <a:latin typeface="Tw Cen MT" panose="020B0602020104020603" pitchFamily="34" charset="0"/>
               </a:rPr>
               <a:t>iOS</a:t>
+            </a:r>
+          </a:p>
+        </p:txBody>
+      </p:sp>
+      <p:grpSp>
+        <p:nvGrpSpPr>
+          <p:cNvPr id="88" name="Grupo 87">
+            <a:extLst>
+              <a:ext uri="{FF2B5EF4-FFF2-40B4-BE49-F238E27FC236}">
+                <a16:creationId xmlns:a16="http://schemas.microsoft.com/office/drawing/2014/main" id="{A6403661-3DAD-4E7E-BFE5-DD7E6EB00A23}"/>
+              </a:ext>
+            </a:extLst>
+          </p:cNvPr>
+          <p:cNvGrpSpPr/>
+          <p:nvPr/>
+        </p:nvGrpSpPr>
+        <p:grpSpPr>
+          <a:xfrm>
+            <a:off x="8103639" y="3886287"/>
+            <a:ext cx="2786099" cy="2360918"/>
+            <a:chOff x="3888254" y="1875838"/>
+            <a:chExt cx="4045435" cy="4715135"/>
+          </a:xfrm>
+        </p:grpSpPr>
+        <p:pic>
+          <p:nvPicPr>
+            <p:cNvPr id="89" name="Picture 13">
+              <a:extLst>
+                <a:ext uri="{FF2B5EF4-FFF2-40B4-BE49-F238E27FC236}">
+                  <a16:creationId xmlns:a16="http://schemas.microsoft.com/office/drawing/2014/main" id="{82346DCB-1323-4EF9-9210-F60B63B97389}"/>
+                </a:ext>
+              </a:extLst>
+            </p:cNvPr>
+            <p:cNvPicPr>
+              <a:picLocks noChangeAspect="1"/>
+            </p:cNvPicPr>
+            <p:nvPr/>
+          </p:nvPicPr>
+          <p:blipFill rotWithShape="1">
+            <a:blip r:embed="rId8">
+              <a:extLst>
+                <a:ext uri="{28A0092B-C50C-407E-A947-70E740481C1C}">
+                  <a14:useLocalDpi xmlns:a14="http://schemas.microsoft.com/office/drawing/2010/main" val="0"/>
+                </a:ext>
+              </a:extLst>
+            </a:blip>
+            <a:srcRect l="27242" r="612"/>
+            <a:stretch/>
+          </p:blipFill>
+          <p:spPr>
+            <a:xfrm>
+              <a:off x="4786965" y="1875838"/>
+              <a:ext cx="1950417" cy="2334000"/>
+            </a:xfrm>
+            <a:prstGeom prst="ellipse">
+              <a:avLst/>
+            </a:prstGeom>
+          </p:spPr>
+        </p:pic>
+        <p:sp>
+          <p:nvSpPr>
+            <p:cNvPr id="90" name="TextBox 15">
+              <a:extLst>
+                <a:ext uri="{FF2B5EF4-FFF2-40B4-BE49-F238E27FC236}">
+                  <a16:creationId xmlns:a16="http://schemas.microsoft.com/office/drawing/2014/main" id="{CCABD9EE-D087-44FF-8814-E62D0AA76BA8}"/>
+                </a:ext>
+              </a:extLst>
+            </p:cNvPr>
+            <p:cNvSpPr txBox="1"/>
+            <p:nvPr/>
+          </p:nvSpPr>
+          <p:spPr>
+            <a:xfrm>
+              <a:off x="3888254" y="4628186"/>
+              <a:ext cx="4045435" cy="1962787"/>
+            </a:xfrm>
+            <a:prstGeom prst="rect">
+              <a:avLst/>
+            </a:prstGeom>
+            <a:noFill/>
+          </p:spPr>
+          <p:txBody>
+            <a:bodyPr wrap="square" rtlCol="0">
+              <a:spAutoFit/>
+            </a:bodyPr>
+            <a:lstStyle/>
+            <a:p>
+              <a:pPr algn="ctr"/>
+              <a:r>
+                <a:rPr lang="en-US" sz="3200" dirty="0">
+                  <a:solidFill>
+                    <a:srgbClr val="EAB936"/>
+                  </a:solidFill>
+                  <a:latin typeface="Tw Cen MT" panose="020B0602020104020603" pitchFamily="34" charset="0"/>
+                </a:rPr>
+                <a:t>Miguel Gallego</a:t>
+              </a:r>
+            </a:p>
+          </p:txBody>
+        </p:sp>
+      </p:grpSp>
+      <p:sp>
+        <p:nvSpPr>
+          <p:cNvPr id="91" name="TextBox 15">
+            <a:extLst>
+              <a:ext uri="{FF2B5EF4-FFF2-40B4-BE49-F238E27FC236}">
+                <a16:creationId xmlns:a16="http://schemas.microsoft.com/office/drawing/2014/main" id="{A530D1F9-EA9D-4619-91B3-8D90E2C20F06}"/>
+              </a:ext>
+            </a:extLst>
+          </p:cNvPr>
+          <p:cNvSpPr txBox="1"/>
+          <p:nvPr/>
+        </p:nvSpPr>
+        <p:spPr>
+          <a:xfrm>
+            <a:off x="8682871" y="3257131"/>
+            <a:ext cx="1491566" cy="584775"/>
+          </a:xfrm>
+          <a:prstGeom prst="rect">
+            <a:avLst/>
+          </a:prstGeom>
+          <a:noFill/>
+        </p:spPr>
+        <p:txBody>
+          <a:bodyPr wrap="square" rtlCol="0">
+            <a:spAutoFit/>
+          </a:bodyPr>
+          <a:lstStyle/>
+          <a:p>
+            <a:pPr algn="ctr"/>
+            <a:r>
+              <a:rPr lang="es-MX" sz="3200" dirty="0">
+                <a:solidFill>
+                  <a:srgbClr val="E2B437"/>
+                </a:solidFill>
+                <a:latin typeface="Tw Cen MT" panose="020B0602020104020603" pitchFamily="34" charset="0"/>
+              </a:rPr>
+              <a:t>QA</a:t>
             </a:r>
           </a:p>
         </p:txBody>
@@ -17719,6 +17859,169 @@
                             </p:childTnLst>
                           </p:cTn>
                         </p:par>
+                        <p:par>
+                          <p:cTn id="43" fill="hold">
+                            <p:stCondLst>
+                              <p:cond delay="2000"/>
+                            </p:stCondLst>
+                            <p:childTnLst>
+                              <p:par>
+                                <p:cTn id="44" presetID="2" presetClass="entr" presetSubtype="4" fill="hold" nodeType="afterEffect">
+                                  <p:stCondLst>
+                                    <p:cond delay="0"/>
+                                  </p:stCondLst>
+                                  <p:childTnLst>
+                                    <p:set>
+                                      <p:cBhvr>
+                                        <p:cTn id="45" dur="1" fill="hold">
+                                          <p:stCondLst>
+                                            <p:cond delay="0"/>
+                                          </p:stCondLst>
+                                        </p:cTn>
+                                        <p:tgtEl>
+                                          <p:spTgt spid="88"/>
+                                        </p:tgtEl>
+                                        <p:attrNameLst>
+                                          <p:attrName>style.visibility</p:attrName>
+                                        </p:attrNameLst>
+                                      </p:cBhvr>
+                                      <p:to>
+                                        <p:strVal val="visible"/>
+                                      </p:to>
+                                    </p:set>
+                                    <p:anim calcmode="lin" valueType="num">
+                                      <p:cBhvr additive="base">
+                                        <p:cTn id="46" dur="500" fill="hold"/>
+                                        <p:tgtEl>
+                                          <p:spTgt spid="88"/>
+                                        </p:tgtEl>
+                                        <p:attrNameLst>
+                                          <p:attrName>ppt_x</p:attrName>
+                                        </p:attrNameLst>
+                                      </p:cBhvr>
+                                      <p:tavLst>
+                                        <p:tav tm="0">
+                                          <p:val>
+                                            <p:strVal val="#ppt_x"/>
+                                          </p:val>
+                                        </p:tav>
+                                        <p:tav tm="100000">
+                                          <p:val>
+                                            <p:strVal val="#ppt_x"/>
+                                          </p:val>
+                                        </p:tav>
+                                      </p:tavLst>
+                                    </p:anim>
+                                    <p:anim calcmode="lin" valueType="num">
+                                      <p:cBhvr additive="base">
+                                        <p:cTn id="47" dur="500" fill="hold"/>
+                                        <p:tgtEl>
+                                          <p:spTgt spid="88"/>
+                                        </p:tgtEl>
+                                        <p:attrNameLst>
+                                          <p:attrName>ppt_y</p:attrName>
+                                        </p:attrNameLst>
+                                      </p:cBhvr>
+                                      <p:tavLst>
+                                        <p:tav tm="0">
+                                          <p:val>
+                                            <p:strVal val="1+#ppt_h/2"/>
+                                          </p:val>
+                                        </p:tav>
+                                        <p:tav tm="100000">
+                                          <p:val>
+                                            <p:strVal val="#ppt_y"/>
+                                          </p:val>
+                                        </p:tav>
+                                      </p:tavLst>
+                                    </p:anim>
+                                  </p:childTnLst>
+                                </p:cTn>
+                              </p:par>
+                              <p:par>
+                                <p:cTn id="48" presetID="53" presetClass="entr" presetSubtype="16" fill="hold" grpId="0" nodeType="withEffect">
+                                  <p:stCondLst>
+                                    <p:cond delay="0"/>
+                                  </p:stCondLst>
+                                  <p:childTnLst>
+                                    <p:set>
+                                      <p:cBhvr>
+                                        <p:cTn id="49" dur="1" fill="hold">
+                                          <p:stCondLst>
+                                            <p:cond delay="0"/>
+                                          </p:stCondLst>
+                                        </p:cTn>
+                                        <p:tgtEl>
+                                          <p:spTgt spid="91"/>
+                                        </p:tgtEl>
+                                        <p:attrNameLst>
+                                          <p:attrName>style.visibility</p:attrName>
+                                        </p:attrNameLst>
+                                      </p:cBhvr>
+                                      <p:to>
+                                        <p:strVal val="visible"/>
+                                      </p:to>
+                                    </p:set>
+                                    <p:anim calcmode="lin" valueType="num">
+                                      <p:cBhvr>
+                                        <p:cTn id="50" dur="500" fill="hold"/>
+                                        <p:tgtEl>
+                                          <p:spTgt spid="91"/>
+                                        </p:tgtEl>
+                                        <p:attrNameLst>
+                                          <p:attrName>ppt_w</p:attrName>
+                                        </p:attrNameLst>
+                                      </p:cBhvr>
+                                      <p:tavLst>
+                                        <p:tav tm="0">
+                                          <p:val>
+                                            <p:fltVal val="0"/>
+                                          </p:val>
+                                        </p:tav>
+                                        <p:tav tm="100000">
+                                          <p:val>
+                                            <p:strVal val="#ppt_w"/>
+                                          </p:val>
+                                        </p:tav>
+                                      </p:tavLst>
+                                    </p:anim>
+                                    <p:anim calcmode="lin" valueType="num">
+                                      <p:cBhvr>
+                                        <p:cTn id="51" dur="500" fill="hold"/>
+                                        <p:tgtEl>
+                                          <p:spTgt spid="91"/>
+                                        </p:tgtEl>
+                                        <p:attrNameLst>
+                                          <p:attrName>ppt_h</p:attrName>
+                                        </p:attrNameLst>
+                                      </p:cBhvr>
+                                      <p:tavLst>
+                                        <p:tav tm="0">
+                                          <p:val>
+                                            <p:fltVal val="0"/>
+                                          </p:val>
+                                        </p:tav>
+                                        <p:tav tm="100000">
+                                          <p:val>
+                                            <p:strVal val="#ppt_h"/>
+                                          </p:val>
+                                        </p:tav>
+                                      </p:tavLst>
+                                    </p:anim>
+                                    <p:animEffect transition="in" filter="fade">
+                                      <p:cBhvr>
+                                        <p:cTn id="52" dur="500"/>
+                                        <p:tgtEl>
+                                          <p:spTgt spid="91"/>
+                                        </p:tgtEl>
+                                      </p:cBhvr>
+                                    </p:animEffect>
+                                  </p:childTnLst>
+                                </p:cTn>
+                              </p:par>
+                            </p:childTnLst>
+                          </p:cTn>
+                        </p:par>
                       </p:childTnLst>
                     </p:cTn>
                   </p:par>
@@ -17747,6 +18050,7 @@
       <p:bldP spid="42" grpId="0"/>
       <p:bldP spid="83" grpId="0"/>
       <p:bldP spid="87" grpId="0"/>
+      <p:bldP spid="91" grpId="0"/>
     </p:bldLst>
   </p:timing>
 </p:sld>

</xml_diff>